<commit_message>
Updated lectures 1 and 2
</commit_message>
<xml_diff>
--- a/Lectures/CITS1003-1 Overview.pptx
+++ b/Lectures/CITS1003-1 Overview.pptx
@@ -3107,7 +3107,7 @@
           <a:p>
             <a:fld id="{6D6D7260-B7E4-B548-BD1F-84ED14536037}" type="datetimeFigureOut">
               <a:rPr lang="en-AU" smtClean="0"/>
-              <a:t>20/7/21</a:t>
+              <a:t>29/7/21</a:t>
             </a:fld>
             <a:endParaRPr lang="en-AU"/>
           </a:p>
@@ -3560,7 +3560,7 @@
           <a:p>
             <a:fld id="{88D38747-4367-4BD2-8D51-C97E202738E2}" type="datetime1">
               <a:rPr lang="en-US" smtClean="0"/>
-              <a:t>7/20/21</a:t>
+              <a:t>7/29/21</a:t>
             </a:fld>
             <a:endParaRPr lang="en-US" dirty="0"/>
           </a:p>
@@ -3865,7 +3865,7 @@
           <a:p>
             <a:fld id="{11F1B079-7EF0-44EE-B798-BCC497C9F3B2}" type="datetime1">
               <a:rPr lang="en-US" smtClean="0"/>
-              <a:t>7/20/21</a:t>
+              <a:t>7/29/21</a:t>
             </a:fld>
             <a:endParaRPr lang="en-US" dirty="0"/>
           </a:p>
@@ -4059,7 +4059,7 @@
           <a:p>
             <a:fld id="{28FF70A8-1D13-4657-95F0-A9EA54967B8D}" type="datetime1">
               <a:rPr lang="en-US" smtClean="0"/>
-              <a:t>7/20/21</a:t>
+              <a:t>7/29/21</a:t>
             </a:fld>
             <a:endParaRPr lang="en-US" dirty="0"/>
           </a:p>
@@ -4322,7 +4322,7 @@
           <a:p>
             <a:fld id="{21EB90AC-71BD-4C7F-8ACA-7B3F18292E63}" type="datetime1">
               <a:rPr lang="en-US" smtClean="0"/>
-              <a:t>7/20/21</a:t>
+              <a:t>7/29/21</a:t>
             </a:fld>
             <a:endParaRPr lang="en-US" dirty="0"/>
           </a:p>
@@ -4758,7 +4758,7 @@
           <a:p>
             <a:fld id="{4E6EFC2C-8905-46F0-B443-CE905B76BA01}" type="datetime1">
               <a:rPr lang="en-US" smtClean="0"/>
-              <a:t>7/20/21</a:t>
+              <a:t>7/29/21</a:t>
             </a:fld>
             <a:endParaRPr lang="en-US" dirty="0"/>
           </a:p>
@@ -5295,7 +5295,7 @@
           <a:p>
             <a:fld id="{D9079DC3-C9B5-499E-9140-0DC28B7074E2}" type="datetime1">
               <a:rPr lang="en-US" smtClean="0"/>
-              <a:t>7/20/21</a:t>
+              <a:t>7/29/21</a:t>
             </a:fld>
             <a:endParaRPr lang="en-US" dirty="0"/>
           </a:p>
@@ -6177,7 +6177,7 @@
           <a:p>
             <a:fld id="{30BB33EA-E472-4D22-9C03-A9C14AA21CED}" type="datetime1">
               <a:rPr lang="en-US" smtClean="0"/>
-              <a:t>7/20/21</a:t>
+              <a:t>7/29/21</a:t>
             </a:fld>
             <a:endParaRPr lang="en-US" dirty="0"/>
           </a:p>
@@ -6347,7 +6347,7 @@
           <a:p>
             <a:fld id="{217E833E-1B6D-415F-AD29-75AE8C43BD0D}" type="datetime1">
               <a:rPr lang="en-US" smtClean="0"/>
-              <a:t>7/20/21</a:t>
+              <a:t>7/29/21</a:t>
             </a:fld>
             <a:endParaRPr lang="en-US" dirty="0"/>
           </a:p>
@@ -6531,7 +6531,7 @@
           <a:p>
             <a:fld id="{8452596F-08A7-4B70-989A-F2B1CF31E66B}" type="datetime1">
               <a:rPr lang="en-US" smtClean="0"/>
-              <a:t>7/20/21</a:t>
+              <a:t>7/29/21</a:t>
             </a:fld>
             <a:endParaRPr lang="en-US" dirty="0"/>
           </a:p>
@@ -6701,7 +6701,7 @@
           <a:p>
             <a:fld id="{73C55A3C-5767-4844-A0A3-83778C2E5409}" type="datetime1">
               <a:rPr lang="en-US" smtClean="0"/>
-              <a:t>7/20/21</a:t>
+              <a:t>7/29/21</a:t>
             </a:fld>
             <a:endParaRPr lang="en-US" dirty="0"/>
           </a:p>
@@ -6945,7 +6945,7 @@
           <a:p>
             <a:fld id="{CAE507A8-A5CF-4D38-AB86-7EDDA87A85D4}" type="datetime1">
               <a:rPr lang="en-US" smtClean="0"/>
-              <a:t>7/20/21</a:t>
+              <a:t>7/29/21</a:t>
             </a:fld>
             <a:endParaRPr lang="en-US" dirty="0"/>
           </a:p>
@@ -7187,7 +7187,7 @@
           <a:p>
             <a:fld id="{BDFCD27C-8599-43EF-BA1D-14DDC1946E06}" type="datetime1">
               <a:rPr lang="en-US" smtClean="0"/>
-              <a:t>7/20/21</a:t>
+              <a:t>7/29/21</a:t>
             </a:fld>
             <a:endParaRPr lang="en-US" dirty="0"/>
           </a:p>
@@ -7668,7 +7668,7 @@
           <a:p>
             <a:fld id="{49343D99-809A-49C0-96E5-4250D0B498EE}" type="datetime1">
               <a:rPr lang="en-US" smtClean="0"/>
-              <a:t>7/20/21</a:t>
+              <a:t>7/29/21</a:t>
             </a:fld>
             <a:endParaRPr lang="en-US" dirty="0"/>
           </a:p>
@@ -7786,7 +7786,7 @@
           <a:p>
             <a:fld id="{A143DE9B-B678-4EFB-BB7D-A4370204A0B0}" type="datetime1">
               <a:rPr lang="en-US" smtClean="0"/>
-              <a:t>7/20/21</a:t>
+              <a:t>7/29/21</a:t>
             </a:fld>
             <a:endParaRPr lang="en-US" dirty="0"/>
           </a:p>
@@ -7881,7 +7881,7 @@
           <a:p>
             <a:fld id="{E68812DA-F765-4142-A6A3-A8ED7235E082}" type="datetime1">
               <a:rPr lang="en-US" smtClean="0"/>
-              <a:t>7/20/21</a:t>
+              <a:t>7/29/21</a:t>
             </a:fld>
             <a:endParaRPr lang="en-US" dirty="0"/>
           </a:p>
@@ -8136,7 +8136,7 @@
           <a:p>
             <a:fld id="{3E0277FD-7DE6-41D4-930D-AC99F5AFE54E}" type="datetime1">
               <a:rPr lang="en-US" smtClean="0"/>
-              <a:t>7/20/21</a:t>
+              <a:t>7/29/21</a:t>
             </a:fld>
             <a:endParaRPr lang="en-US" dirty="0"/>
           </a:p>
@@ -8443,7 +8443,7 @@
           <a:p>
             <a:fld id="{9EA15526-7079-4B7B-987C-1B5FAE11A0FF}" type="datetime1">
               <a:rPr lang="en-US" smtClean="0"/>
-              <a:t>7/20/21</a:t>
+              <a:t>7/29/21</a:t>
             </a:fld>
             <a:endParaRPr lang="en-US" dirty="0"/>
           </a:p>
@@ -8678,7 +8678,7 @@
           <a:p>
             <a:fld id="{073ED0CC-082F-4160-86E5-0D6041F12778}" type="datetime1">
               <a:rPr lang="en-US" smtClean="0"/>
-              <a:t>7/20/21</a:t>
+              <a:t>7/29/21</a:t>
             </a:fld>
             <a:endParaRPr lang="en-US" dirty="0"/>
           </a:p>
@@ -9589,7 +9589,7 @@
           </a:effectLst>
           <a:extLst>
             <a:ext uri="{91240B29-F687-4f45-9708-019B960494DF}">
-              <a14:hiddenLine xmlns="" xmlns:a14="http://schemas.microsoft.com/office/drawing/2010/main" xmlns:p14="http://schemas.microsoft.com/office/powerpoint/2010/main" xmlns:a16="http://schemas.microsoft.com/office/drawing/2014/main" w="9525">
+              <a14:hiddenLine xmlns:a16="http://schemas.microsoft.com/office/drawing/2014/main" xmlns:p14="http://schemas.microsoft.com/office/powerpoint/2010/main" xmlns:a14="http://schemas.microsoft.com/office/drawing/2010/main" xmlns="" w="9525">
                 <a:solidFill>
                   <a:srgbClr val="000000"/>
                 </a:solidFill>
@@ -10508,7 +10508,7 @@
         <p:spPr/>
         <p:txBody>
           <a:bodyPr>
-            <a:normAutofit fontScale="92500" lnSpcReduction="20000"/>
+            <a:normAutofit fontScale="92500"/>
           </a:bodyPr>
           <a:lstStyle/>
           <a:p>
@@ -10577,13 +10577,7 @@
               <a:rPr lang="en-GB" dirty="0">
                 <a:effectLst/>
               </a:rPr>
-              <a:t>Practical laboratory work will assist in practical aspects of Cybersecurity </a:t>
-            </a:r>
-          </a:p>
-          <a:p>
-            <a:r>
-              <a:rPr lang="en-AU" dirty="0"/>
-              <a:t>An essay will allow for reflection on a topic in more depth</a:t>
+              <a:t>Practical laboratory work will assist in practical aspects of Cybersecurity</a:t>
             </a:r>
           </a:p>
         </p:txBody>

</xml_diff>